<commit_message>
typo changes to pptx
</commit_message>
<xml_diff>
--- a/tf_prez.pptx
+++ b/tf_prez.pptx
@@ -3754,7 +3754,7 @@
         <p:spPr>
           <a:xfrm>
             <a:off x="1600200" y="1338200"/>
-            <a:ext cx="2800350" cy="3293209"/>
+            <a:ext cx="2800350" cy="2492990"/>
           </a:xfrm>
           <a:prstGeom prst="rect">
             <a:avLst/>
@@ -3787,7 +3787,7 @@
                 <a:latin typeface="Product Sans" panose="020B0403030502040203" pitchFamily="34" charset="0"/>
                 <a:cs typeface="Pristina" panose="020F0502020204030204" pitchFamily="34" charset="0"/>
               </a:rPr>
-              <a:t>Just remove the hidden and you you see the familiar model.</a:t>
+              <a:t>Just remove the hidden layer.</a:t>
             </a:r>
           </a:p>
         </p:txBody>
@@ -6156,7 +6156,7 @@
               <a:rPr lang="en-US" sz="2600" dirty="0">
                 <a:latin typeface="Product Sans" panose="020B0403030502040203" pitchFamily="34" charset="0"/>
               </a:rPr>
-              <a:t>Each node is a dot product of previous nodes in the layer before it</a:t>
+              <a:t>Each node is a dot product of previous nodes in the layer before it.</a:t>
             </a:r>
           </a:p>
         </p:txBody>
@@ -6720,7 +6720,7 @@
               <a:rPr lang="en-US" sz="2600" dirty="0">
                 <a:latin typeface="Product Sans" panose="020B0403030502040203" pitchFamily="34" charset="0"/>
               </a:rPr>
-              <a:t>Each node is a dot product of previous nodes in the layer before it</a:t>
+              <a:t>Each node is a dot product of previous nodes in the layer before it.</a:t>
             </a:r>
           </a:p>
         </p:txBody>
@@ -7088,8 +7088,8 @@
           </a:prstGeom>
         </p:spPr>
       </p:pic>
-      <mc:AlternateContent xmlns:mc="http://schemas.openxmlformats.org/markup-compatibility/2006">
-        <mc:Choice xmlns:a14="http://schemas.microsoft.com/office/drawing/2010/main" Requires="a14">
+      <mc:AlternateContent xmlns:mc="http://schemas.openxmlformats.org/markup-compatibility/2006" xmlns:a14="http://schemas.microsoft.com/office/drawing/2010/main">
+        <mc:Choice Requires="a14">
           <p:sp>
             <p:nvSpPr>
               <p:cNvPr id="10" name="TextBox 9">
@@ -8034,7 +8034,7 @@
             </p:txBody>
           </p:sp>
         </mc:Choice>
-        <mc:Fallback>
+        <mc:Fallback xmlns="">
           <p:sp>
             <p:nvSpPr>
               <p:cNvPr id="10" name="TextBox 9">

</xml_diff>